<commit_message>
Refs #4. Adding technology to presentation.
</commit_message>
<xml_diff>
--- a/doc/articles/part1/presentation.pptx
+++ b/doc/articles/part1/presentation.pptx
@@ -8,14 +8,16 @@
     <p:sldId id="256" r:id="rId2"/>
     <p:sldId id="261" r:id="rId3"/>
     <p:sldId id="262" r:id="rId4"/>
-    <p:sldId id="257" r:id="rId5"/>
-    <p:sldId id="263" r:id="rId6"/>
-    <p:sldId id="264" r:id="rId7"/>
-    <p:sldId id="266" r:id="rId8"/>
-    <p:sldId id="265" r:id="rId9"/>
-    <p:sldId id="258" r:id="rId10"/>
-    <p:sldId id="260" r:id="rId11"/>
-    <p:sldId id="259" r:id="rId12"/>
+    <p:sldId id="268" r:id="rId5"/>
+    <p:sldId id="267" r:id="rId6"/>
+    <p:sldId id="257" r:id="rId7"/>
+    <p:sldId id="263" r:id="rId8"/>
+    <p:sldId id="264" r:id="rId9"/>
+    <p:sldId id="266" r:id="rId10"/>
+    <p:sldId id="265" r:id="rId11"/>
+    <p:sldId id="258" r:id="rId12"/>
+    <p:sldId id="260" r:id="rId13"/>
+    <p:sldId id="259" r:id="rId14"/>
   </p:sldIdLst>
   <p:sldSz cx="9144000" cy="6858000" type="screen4x3"/>
   <p:notesSz cx="6858000" cy="9144000"/>
@@ -9103,6 +9105,180 @@
           <a:chExt cx="0" cy="0"/>
         </a:xfrm>
       </p:grpSpPr>
+      <p:sp>
+        <p:nvSpPr>
+          <p:cNvPr id="2" name="Title 1"/>
+          <p:cNvSpPr>
+            <a:spLocks noGrp="1"/>
+          </p:cNvSpPr>
+          <p:nvPr>
+            <p:ph type="title"/>
+          </p:nvPr>
+        </p:nvSpPr>
+        <p:spPr/>
+        <p:txBody>
+          <a:bodyPr/>
+          <a:lstStyle/>
+          <a:p>
+            <a:r>
+              <a:rPr lang="en-US" dirty="0" smtClean="0"/>
+              <a:t>Wireframe: </a:t>
+            </a:r>
+            <a:r>
+              <a:rPr lang="en-US" dirty="0" err="1" smtClean="0"/>
+              <a:t>Inscri</a:t>
+            </a:r>
+            <a:r>
+              <a:rPr lang="en-US" dirty="0" err="1" smtClean="0"/>
+              <a:t>ção</a:t>
+            </a:r>
+            <a:r>
+              <a:rPr lang="en-US" dirty="0"/>
+              <a:t> </a:t>
+            </a:r>
+            <a:r>
+              <a:rPr lang="en-US" dirty="0" err="1" smtClean="0"/>
+              <a:t>em</a:t>
+            </a:r>
+            <a:r>
+              <a:rPr lang="en-US" dirty="0" smtClean="0"/>
+              <a:t> </a:t>
+            </a:r>
+            <a:r>
+              <a:rPr lang="en-US" dirty="0" err="1" smtClean="0"/>
+              <a:t>projetos</a:t>
+            </a:r>
+            <a:endParaRPr lang="en-US" dirty="0"/>
+          </a:p>
+        </p:txBody>
+      </p:sp>
+      <p:pic>
+        <p:nvPicPr>
+          <p:cNvPr id="4" name="Content Placeholder 3" descr="10.student.pick-project.png"/>
+          <p:cNvPicPr>
+            <a:picLocks noGrp="1" noChangeAspect="1"/>
+          </p:cNvPicPr>
+          <p:nvPr>
+            <p:ph idx="1"/>
+          </p:nvPr>
+        </p:nvPicPr>
+        <p:blipFill>
+          <a:blip r:embed="rId2">
+            <a:extLst>
+              <a:ext uri="{28A0092B-C50C-407E-A947-70E740481C1C}">
+                <a14:useLocalDpi xmlns:a14="http://schemas.microsoft.com/office/drawing/2010/main" val="0"/>
+              </a:ext>
+            </a:extLst>
+          </a:blip>
+          <a:srcRect l="-20871" r="-20871"/>
+          <a:stretch>
+            <a:fillRect/>
+          </a:stretch>
+        </p:blipFill>
+        <p:spPr/>
+      </p:pic>
+    </p:spTree>
+    <p:extLst>
+      <p:ext uri="{BB962C8B-B14F-4D97-AF65-F5344CB8AC3E}">
+        <p14:creationId xmlns:p14="http://schemas.microsoft.com/office/powerpoint/2010/main" val="3336233356"/>
+      </p:ext>
+    </p:extLst>
+  </p:cSld>
+  <p:clrMapOvr>
+    <a:masterClrMapping/>
+  </p:clrMapOvr>
+</p:sld>
+</file>
+
+<file path=ppt/slides/slide11.xml><?xml version="1.0" encoding="utf-8"?>
+<p:sld xmlns:a="http://schemas.openxmlformats.org/drawingml/2006/main" xmlns:r="http://schemas.openxmlformats.org/officeDocument/2006/relationships" xmlns:p="http://schemas.openxmlformats.org/presentationml/2006/main">
+  <p:cSld>
+    <p:spTree>
+      <p:nvGrpSpPr>
+        <p:cNvPr id="1" name=""/>
+        <p:cNvGrpSpPr/>
+        <p:nvPr/>
+      </p:nvGrpSpPr>
+      <p:grpSpPr>
+        <a:xfrm>
+          <a:off x="0" y="0"/>
+          <a:ext cx="0" cy="0"/>
+          <a:chOff x="0" y="0"/>
+          <a:chExt cx="0" cy="0"/>
+        </a:xfrm>
+      </p:grpSpPr>
+      <p:sp>
+        <p:nvSpPr>
+          <p:cNvPr id="2" name="Title 1"/>
+          <p:cNvSpPr>
+            <a:spLocks noGrp="1"/>
+          </p:cNvSpPr>
+          <p:nvPr>
+            <p:ph type="title"/>
+          </p:nvPr>
+        </p:nvSpPr>
+        <p:spPr/>
+        <p:txBody>
+          <a:bodyPr/>
+          <a:lstStyle/>
+          <a:p>
+            <a:r>
+              <a:rPr lang="en-US" dirty="0" err="1" smtClean="0"/>
+              <a:t>Modelagem</a:t>
+            </a:r>
+            <a:endParaRPr lang="en-US" dirty="0"/>
+          </a:p>
+        </p:txBody>
+      </p:sp>
+      <p:sp>
+        <p:nvSpPr>
+          <p:cNvPr id="3" name="Text Placeholder 2"/>
+          <p:cNvSpPr>
+            <a:spLocks noGrp="1"/>
+          </p:cNvSpPr>
+          <p:nvPr>
+            <p:ph type="body" idx="1"/>
+          </p:nvPr>
+        </p:nvSpPr>
+        <p:spPr/>
+        <p:txBody>
+          <a:bodyPr/>
+          <a:lstStyle/>
+          <a:p>
+            <a:endParaRPr lang="en-US"/>
+          </a:p>
+        </p:txBody>
+      </p:sp>
+    </p:spTree>
+    <p:extLst>
+      <p:ext uri="{BB962C8B-B14F-4D97-AF65-F5344CB8AC3E}">
+        <p14:creationId xmlns:p14="http://schemas.microsoft.com/office/powerpoint/2010/main" val="3219114231"/>
+      </p:ext>
+    </p:extLst>
+  </p:cSld>
+  <p:clrMapOvr>
+    <a:masterClrMapping/>
+  </p:clrMapOvr>
+</p:sld>
+</file>
+
+<file path=ppt/slides/slide12.xml><?xml version="1.0" encoding="utf-8"?>
+<p:sld xmlns:a="http://schemas.openxmlformats.org/drawingml/2006/main" xmlns:r="http://schemas.openxmlformats.org/officeDocument/2006/relationships" xmlns:p="http://schemas.openxmlformats.org/presentationml/2006/main">
+  <p:cSld>
+    <p:spTree>
+      <p:nvGrpSpPr>
+        <p:cNvPr id="1" name=""/>
+        <p:cNvGrpSpPr/>
+        <p:nvPr/>
+      </p:nvGrpSpPr>
+      <p:grpSpPr>
+        <a:xfrm>
+          <a:off x="0" y="0"/>
+          <a:ext cx="0" cy="0"/>
+          <a:chOff x="0" y="0"/>
+          <a:chExt cx="0" cy="0"/>
+        </a:xfrm>
+      </p:grpSpPr>
       <p:pic>
         <p:nvPicPr>
           <p:cNvPr id="6" name="Content Placeholder 5" descr="eer-diagram.png"/>
@@ -9144,7 +9320,7 @@
 </p:sld>
 </file>
 
-<file path=ppt/slides/slide11.xml><?xml version="1.0" encoding="utf-8"?>
+<file path=ppt/slides/slide13.xml><?xml version="1.0" encoding="utf-8"?>
 <p:sld xmlns:a="http://schemas.openxmlformats.org/drawingml/2006/main" xmlns:r="http://schemas.openxmlformats.org/officeDocument/2006/relationships" xmlns:p="http://schemas.openxmlformats.org/presentationml/2006/main">
   <p:cSld>
     <p:spTree>
@@ -9554,10 +9730,18 @@
           <a:lstStyle/>
           <a:p>
             <a:r>
+              <a:rPr lang="en-US" dirty="0" err="1" smtClean="0"/>
+              <a:t>Tecnologias</a:t>
+            </a:r>
+            <a:r>
               <a:rPr lang="en-US" dirty="0" smtClean="0"/>
-              <a:t>Interfaces</a:t>
-            </a:r>
-            <a:endParaRPr lang="en-US" dirty="0"/>
+              <a:t> </a:t>
+            </a:r>
+            <a:r>
+              <a:rPr lang="en-US" smtClean="0"/>
+              <a:t>utilizadas</a:t>
+            </a:r>
+            <a:endParaRPr lang="en-US"/>
           </a:p>
         </p:txBody>
       </p:sp>
@@ -9576,14 +9760,14 @@
           <a:bodyPr/>
           <a:lstStyle/>
           <a:p>
-            <a:endParaRPr lang="en-US" dirty="0"/>
+            <a:endParaRPr lang="en-US"/>
           </a:p>
         </p:txBody>
       </p:sp>
     </p:spTree>
     <p:extLst>
       <p:ext uri="{BB962C8B-B14F-4D97-AF65-F5344CB8AC3E}">
-        <p14:creationId xmlns:p14="http://schemas.microsoft.com/office/powerpoint/2010/main" val="3900454404"/>
+        <p14:creationId xmlns:p14="http://schemas.microsoft.com/office/powerpoint/2010/main" val="3383714032"/>
       </p:ext>
     </p:extLst>
   </p:cSld>
@@ -9594,6 +9778,74 @@
 </file>
 
 <file path=ppt/slides/slide5.xml><?xml version="1.0" encoding="utf-8"?>
+<p:sld xmlns:a="http://schemas.openxmlformats.org/drawingml/2006/main" xmlns:r="http://schemas.openxmlformats.org/officeDocument/2006/relationships" xmlns:p="http://schemas.openxmlformats.org/presentationml/2006/main">
+  <p:cSld>
+    <p:spTree>
+      <p:nvGrpSpPr>
+        <p:cNvPr id="1" name=""/>
+        <p:cNvGrpSpPr/>
+        <p:nvPr/>
+      </p:nvGrpSpPr>
+      <p:grpSpPr>
+        <a:xfrm>
+          <a:off x="0" y="0"/>
+          <a:ext cx="0" cy="0"/>
+          <a:chOff x="0" y="0"/>
+          <a:chExt cx="0" cy="0"/>
+        </a:xfrm>
+      </p:grpSpPr>
+      <p:sp>
+        <p:nvSpPr>
+          <p:cNvPr id="2" name="Title 1"/>
+          <p:cNvSpPr>
+            <a:spLocks noGrp="1"/>
+          </p:cNvSpPr>
+          <p:nvPr>
+            <p:ph type="title"/>
+          </p:nvPr>
+        </p:nvSpPr>
+        <p:spPr/>
+        <p:txBody>
+          <a:bodyPr/>
+          <a:lstStyle/>
+          <a:p>
+            <a:endParaRPr lang="en-US"/>
+          </a:p>
+        </p:txBody>
+      </p:sp>
+      <p:sp>
+        <p:nvSpPr>
+          <p:cNvPr id="3" name="Content Placeholder 2"/>
+          <p:cNvSpPr>
+            <a:spLocks noGrp="1"/>
+          </p:cNvSpPr>
+          <p:nvPr>
+            <p:ph idx="1"/>
+          </p:nvPr>
+        </p:nvSpPr>
+        <p:spPr/>
+        <p:txBody>
+          <a:bodyPr/>
+          <a:lstStyle/>
+          <a:p>
+            <a:endParaRPr lang="en-US"/>
+          </a:p>
+        </p:txBody>
+      </p:sp>
+    </p:spTree>
+    <p:extLst>
+      <p:ext uri="{BB962C8B-B14F-4D97-AF65-F5344CB8AC3E}">
+        <p14:creationId xmlns:p14="http://schemas.microsoft.com/office/powerpoint/2010/main" val="1792771707"/>
+      </p:ext>
+    </p:extLst>
+  </p:cSld>
+  <p:clrMapOvr>
+    <a:masterClrMapping/>
+  </p:clrMapOvr>
+</p:sld>
+</file>
+
+<file path=ppt/slides/slide6.xml><?xml version="1.0" encoding="utf-8"?>
 <p:sld xmlns:a="http://schemas.openxmlformats.org/drawingml/2006/main" xmlns:r="http://schemas.openxmlformats.org/officeDocument/2006/relationships" xmlns:p="http://schemas.openxmlformats.org/presentationml/2006/main">
   <p:cSld>
     <p:spTree>
@@ -9626,6 +9878,78 @@
           <a:lstStyle/>
           <a:p>
             <a:r>
+              <a:rPr lang="en-US" dirty="0" smtClean="0"/>
+              <a:t>Interfaces</a:t>
+            </a:r>
+            <a:endParaRPr lang="en-US" dirty="0"/>
+          </a:p>
+        </p:txBody>
+      </p:sp>
+      <p:sp>
+        <p:nvSpPr>
+          <p:cNvPr id="5" name="Text Placeholder 4"/>
+          <p:cNvSpPr>
+            <a:spLocks noGrp="1"/>
+          </p:cNvSpPr>
+          <p:nvPr>
+            <p:ph type="body" idx="1"/>
+          </p:nvPr>
+        </p:nvSpPr>
+        <p:spPr/>
+        <p:txBody>
+          <a:bodyPr/>
+          <a:lstStyle/>
+          <a:p>
+            <a:endParaRPr lang="en-US" dirty="0"/>
+          </a:p>
+        </p:txBody>
+      </p:sp>
+    </p:spTree>
+    <p:extLst>
+      <p:ext uri="{BB962C8B-B14F-4D97-AF65-F5344CB8AC3E}">
+        <p14:creationId xmlns:p14="http://schemas.microsoft.com/office/powerpoint/2010/main" val="3900454404"/>
+      </p:ext>
+    </p:extLst>
+  </p:cSld>
+  <p:clrMapOvr>
+    <a:masterClrMapping/>
+  </p:clrMapOvr>
+</p:sld>
+</file>
+
+<file path=ppt/slides/slide7.xml><?xml version="1.0" encoding="utf-8"?>
+<p:sld xmlns:a="http://schemas.openxmlformats.org/drawingml/2006/main" xmlns:r="http://schemas.openxmlformats.org/officeDocument/2006/relationships" xmlns:p="http://schemas.openxmlformats.org/presentationml/2006/main">
+  <p:cSld>
+    <p:spTree>
+      <p:nvGrpSpPr>
+        <p:cNvPr id="1" name=""/>
+        <p:cNvGrpSpPr/>
+        <p:nvPr/>
+      </p:nvGrpSpPr>
+      <p:grpSpPr>
+        <a:xfrm>
+          <a:off x="0" y="0"/>
+          <a:ext cx="0" cy="0"/>
+          <a:chOff x="0" y="0"/>
+          <a:chExt cx="0" cy="0"/>
+        </a:xfrm>
+      </p:grpSpPr>
+      <p:sp>
+        <p:nvSpPr>
+          <p:cNvPr id="4" name="Title 3"/>
+          <p:cNvSpPr>
+            <a:spLocks noGrp="1"/>
+          </p:cNvSpPr>
+          <p:nvPr>
+            <p:ph type="title"/>
+          </p:nvPr>
+        </p:nvSpPr>
+        <p:spPr/>
+        <p:txBody>
+          <a:bodyPr/>
+          <a:lstStyle/>
+          <a:p>
+            <a:r>
               <a:rPr lang="en-US" dirty="0" err="1" smtClean="0"/>
               <a:t>Inscri</a:t>
             </a:r>
@@ -9826,7 +10150,7 @@
 </p:sld>
 </file>
 
-<file path=ppt/slides/slide6.xml><?xml version="1.0" encoding="utf-8"?>
+<file path=ppt/slides/slide8.xml><?xml version="1.0" encoding="utf-8"?>
 <p:sld xmlns:a="http://schemas.openxmlformats.org/drawingml/2006/main" xmlns:r="http://schemas.openxmlformats.org/officeDocument/2006/relationships" xmlns:p="http://schemas.openxmlformats.org/presentationml/2006/main">
   <p:cSld>
     <p:spTree>
@@ -9909,306 +10233,6 @@
 </p:sld>
 </file>
 
-<file path=ppt/slides/slide7.xml><?xml version="1.0" encoding="utf-8"?>
-<p:sld xmlns:a="http://schemas.openxmlformats.org/drawingml/2006/main" xmlns:r="http://schemas.openxmlformats.org/officeDocument/2006/relationships" xmlns:p="http://schemas.openxmlformats.org/presentationml/2006/main">
-  <p:cSld>
-    <p:spTree>
-      <p:nvGrpSpPr>
-        <p:cNvPr id="1" name=""/>
-        <p:cNvGrpSpPr/>
-        <p:nvPr/>
-      </p:nvGrpSpPr>
-      <p:grpSpPr>
-        <a:xfrm>
-          <a:off x="0" y="0"/>
-          <a:ext cx="0" cy="0"/>
-          <a:chOff x="0" y="0"/>
-          <a:chExt cx="0" cy="0"/>
-        </a:xfrm>
-      </p:grpSpPr>
-      <p:sp>
-        <p:nvSpPr>
-          <p:cNvPr id="2" name="Title 1"/>
-          <p:cNvSpPr>
-            <a:spLocks noGrp="1"/>
-          </p:cNvSpPr>
-          <p:nvPr>
-            <p:ph type="title"/>
-          </p:nvPr>
-        </p:nvSpPr>
-        <p:spPr/>
-        <p:txBody>
-          <a:bodyPr/>
-          <a:lstStyle/>
-          <a:p>
-            <a:r>
-              <a:rPr lang="en-US" dirty="0" err="1" smtClean="0"/>
-              <a:t>Inscri</a:t>
-            </a:r>
-            <a:r>
-              <a:rPr lang="en-US" dirty="0" err="1" smtClean="0"/>
-              <a:t>ção</a:t>
-            </a:r>
-            <a:r>
-              <a:rPr lang="en-US" dirty="0" smtClean="0"/>
-              <a:t> </a:t>
-            </a:r>
-            <a:r>
-              <a:rPr lang="en-US" dirty="0" err="1" smtClean="0"/>
-              <a:t>em</a:t>
-            </a:r>
-            <a:r>
-              <a:rPr lang="en-US" dirty="0" smtClean="0"/>
-              <a:t> </a:t>
-            </a:r>
-            <a:r>
-              <a:rPr lang="en-US" dirty="0" err="1" smtClean="0"/>
-              <a:t>projetos</a:t>
-            </a:r>
-            <a:endParaRPr lang="en-US" dirty="0"/>
-          </a:p>
-        </p:txBody>
-      </p:sp>
-      <p:sp>
-        <p:nvSpPr>
-          <p:cNvPr id="3" name="Content Placeholder 2"/>
-          <p:cNvSpPr>
-            <a:spLocks noGrp="1"/>
-          </p:cNvSpPr>
-          <p:nvPr>
-            <p:ph idx="1"/>
-          </p:nvPr>
-        </p:nvSpPr>
-        <p:spPr/>
-        <p:txBody>
-          <a:bodyPr/>
-          <a:lstStyle/>
-          <a:p>
-            <a:r>
-              <a:rPr lang="en-US" dirty="0" err="1" smtClean="0"/>
-              <a:t>Cada</a:t>
-            </a:r>
-            <a:r>
-              <a:rPr lang="en-US" dirty="0" smtClean="0"/>
-              <a:t> </a:t>
-            </a:r>
-            <a:r>
-              <a:rPr lang="en-US" dirty="0" err="1" smtClean="0"/>
-              <a:t>estudante</a:t>
-            </a:r>
-            <a:r>
-              <a:rPr lang="en-US" dirty="0" smtClean="0"/>
-              <a:t> </a:t>
-            </a:r>
-            <a:r>
-              <a:rPr lang="en-US" dirty="0" err="1" smtClean="0"/>
-              <a:t>deve</a:t>
-            </a:r>
-            <a:r>
-              <a:rPr lang="en-US" dirty="0" smtClean="0"/>
-              <a:t> se </a:t>
-            </a:r>
-            <a:r>
-              <a:rPr lang="en-US" dirty="0" err="1" smtClean="0"/>
-              <a:t>inscrever</a:t>
-            </a:r>
-            <a:r>
-              <a:rPr lang="en-US" dirty="0" smtClean="0"/>
-              <a:t> </a:t>
-            </a:r>
-            <a:r>
-              <a:rPr lang="en-US" dirty="0" err="1" smtClean="0"/>
-              <a:t>em</a:t>
-            </a:r>
-            <a:r>
-              <a:rPr lang="en-US" dirty="0" smtClean="0"/>
-              <a:t> um </a:t>
-            </a:r>
-            <a:r>
-              <a:rPr lang="en-US" dirty="0" err="1" smtClean="0"/>
-              <a:t>projeto</a:t>
-            </a:r>
-            <a:r>
-              <a:rPr lang="en-US" dirty="0" smtClean="0"/>
-              <a:t>;</a:t>
-            </a:r>
-          </a:p>
-          <a:p>
-            <a:r>
-              <a:rPr lang="en-US" dirty="0" err="1" smtClean="0"/>
-              <a:t>Os</a:t>
-            </a:r>
-            <a:r>
-              <a:rPr lang="en-US" dirty="0" smtClean="0"/>
-              <a:t> </a:t>
-            </a:r>
-            <a:r>
-              <a:rPr lang="en-US" dirty="0" err="1" smtClean="0"/>
-              <a:t>projetos</a:t>
-            </a:r>
-            <a:r>
-              <a:rPr lang="en-US" dirty="0" smtClean="0"/>
-              <a:t> </a:t>
-            </a:r>
-            <a:r>
-              <a:rPr lang="en-US" dirty="0" err="1" smtClean="0"/>
-              <a:t>servem</a:t>
-            </a:r>
-            <a:r>
-              <a:rPr lang="en-US" dirty="0" smtClean="0"/>
-              <a:t> </a:t>
-            </a:r>
-            <a:r>
-              <a:rPr lang="en-US" dirty="0" err="1" smtClean="0"/>
-              <a:t>como</a:t>
-            </a:r>
-            <a:r>
-              <a:rPr lang="en-US" dirty="0" smtClean="0"/>
-              <a:t> </a:t>
-            </a:r>
-            <a:r>
-              <a:rPr lang="en-US" dirty="0" err="1" smtClean="0"/>
-              <a:t>catalisador</a:t>
-            </a:r>
-            <a:r>
-              <a:rPr lang="en-US" dirty="0" smtClean="0"/>
-              <a:t> do </a:t>
-            </a:r>
-            <a:r>
-              <a:rPr lang="en-US" dirty="0" err="1" smtClean="0"/>
-              <a:t>relacionamento</a:t>
-            </a:r>
-            <a:r>
-              <a:rPr lang="en-US" dirty="0" smtClean="0"/>
-              <a:t> professor x </a:t>
-            </a:r>
-            <a:r>
-              <a:rPr lang="en-US" dirty="0" err="1" smtClean="0"/>
-              <a:t>aluno</a:t>
-            </a:r>
-            <a:r>
-              <a:rPr lang="en-US" smtClean="0"/>
-              <a:t>;</a:t>
-            </a:r>
-            <a:endParaRPr lang="en-US"/>
-          </a:p>
-        </p:txBody>
-      </p:sp>
-    </p:spTree>
-    <p:extLst>
-      <p:ext uri="{BB962C8B-B14F-4D97-AF65-F5344CB8AC3E}">
-        <p14:creationId xmlns:p14="http://schemas.microsoft.com/office/powerpoint/2010/main" val="2101056662"/>
-      </p:ext>
-    </p:extLst>
-  </p:cSld>
-  <p:clrMapOvr>
-    <a:masterClrMapping/>
-  </p:clrMapOvr>
-</p:sld>
-</file>
-
-<file path=ppt/slides/slide8.xml><?xml version="1.0" encoding="utf-8"?>
-<p:sld xmlns:a="http://schemas.openxmlformats.org/drawingml/2006/main" xmlns:r="http://schemas.openxmlformats.org/officeDocument/2006/relationships" xmlns:p="http://schemas.openxmlformats.org/presentationml/2006/main">
-  <p:cSld>
-    <p:spTree>
-      <p:nvGrpSpPr>
-        <p:cNvPr id="1" name=""/>
-        <p:cNvGrpSpPr/>
-        <p:nvPr/>
-      </p:nvGrpSpPr>
-      <p:grpSpPr>
-        <a:xfrm>
-          <a:off x="0" y="0"/>
-          <a:ext cx="0" cy="0"/>
-          <a:chOff x="0" y="0"/>
-          <a:chExt cx="0" cy="0"/>
-        </a:xfrm>
-      </p:grpSpPr>
-      <p:sp>
-        <p:nvSpPr>
-          <p:cNvPr id="2" name="Title 1"/>
-          <p:cNvSpPr>
-            <a:spLocks noGrp="1"/>
-          </p:cNvSpPr>
-          <p:nvPr>
-            <p:ph type="title"/>
-          </p:nvPr>
-        </p:nvSpPr>
-        <p:spPr/>
-        <p:txBody>
-          <a:bodyPr/>
-          <a:lstStyle/>
-          <a:p>
-            <a:r>
-              <a:rPr lang="en-US" dirty="0" smtClean="0"/>
-              <a:t>Wireframe: </a:t>
-            </a:r>
-            <a:r>
-              <a:rPr lang="en-US" dirty="0" err="1" smtClean="0"/>
-              <a:t>Inscri</a:t>
-            </a:r>
-            <a:r>
-              <a:rPr lang="en-US" dirty="0" err="1" smtClean="0"/>
-              <a:t>ção</a:t>
-            </a:r>
-            <a:r>
-              <a:rPr lang="en-US" dirty="0"/>
-              <a:t> </a:t>
-            </a:r>
-            <a:r>
-              <a:rPr lang="en-US" dirty="0" err="1" smtClean="0"/>
-              <a:t>em</a:t>
-            </a:r>
-            <a:r>
-              <a:rPr lang="en-US" dirty="0" smtClean="0"/>
-              <a:t> </a:t>
-            </a:r>
-            <a:r>
-              <a:rPr lang="en-US" dirty="0" err="1" smtClean="0"/>
-              <a:t>projetos</a:t>
-            </a:r>
-            <a:endParaRPr lang="en-US" dirty="0"/>
-          </a:p>
-        </p:txBody>
-      </p:sp>
-      <p:pic>
-        <p:nvPicPr>
-          <p:cNvPr id="4" name="Content Placeholder 3" descr="10.student.pick-project.png"/>
-          <p:cNvPicPr>
-            <a:picLocks noGrp="1" noChangeAspect="1"/>
-          </p:cNvPicPr>
-          <p:nvPr>
-            <p:ph idx="1"/>
-          </p:nvPr>
-        </p:nvPicPr>
-        <p:blipFill>
-          <a:blip r:embed="rId2">
-            <a:extLst>
-              <a:ext uri="{28A0092B-C50C-407E-A947-70E740481C1C}">
-                <a14:useLocalDpi xmlns:a14="http://schemas.microsoft.com/office/drawing/2010/main" val="0"/>
-              </a:ext>
-            </a:extLst>
-          </a:blip>
-          <a:srcRect l="-20871" r="-20871"/>
-          <a:stretch>
-            <a:fillRect/>
-          </a:stretch>
-        </p:blipFill>
-        <p:spPr/>
-      </p:pic>
-    </p:spTree>
-    <p:extLst>
-      <p:ext uri="{BB962C8B-B14F-4D97-AF65-F5344CB8AC3E}">
-        <p14:creationId xmlns:p14="http://schemas.microsoft.com/office/powerpoint/2010/main" val="3336233356"/>
-      </p:ext>
-    </p:extLst>
-  </p:cSld>
-  <p:clrMapOvr>
-    <a:masterClrMapping/>
-  </p:clrMapOvr>
-</p:sld>
-</file>
-
 <file path=ppt/slides/slide9.xml><?xml version="1.0" encoding="utf-8"?>
 <p:sld xmlns:a="http://schemas.openxmlformats.org/drawingml/2006/main" xmlns:r="http://schemas.openxmlformats.org/officeDocument/2006/relationships" xmlns:p="http://schemas.openxmlformats.org/presentationml/2006/main">
   <p:cSld>
@@ -10243,7 +10267,27 @@
           <a:p>
             <a:r>
               <a:rPr lang="en-US" dirty="0" err="1" smtClean="0"/>
-              <a:t>Modelagem</a:t>
+              <a:t>Inscri</a:t>
+            </a:r>
+            <a:r>
+              <a:rPr lang="en-US" dirty="0" err="1" smtClean="0"/>
+              <a:t>ção</a:t>
+            </a:r>
+            <a:r>
+              <a:rPr lang="en-US" dirty="0" smtClean="0"/>
+              <a:t> </a:t>
+            </a:r>
+            <a:r>
+              <a:rPr lang="en-US" dirty="0" err="1" smtClean="0"/>
+              <a:t>em</a:t>
+            </a:r>
+            <a:r>
+              <a:rPr lang="en-US" dirty="0" smtClean="0"/>
+              <a:t> </a:t>
+            </a:r>
+            <a:r>
+              <a:rPr lang="en-US" dirty="0" err="1" smtClean="0"/>
+              <a:t>projetos</a:t>
             </a:r>
             <a:endParaRPr lang="en-US" dirty="0"/>
           </a:p>
@@ -10251,12 +10295,12 @@
       </p:sp>
       <p:sp>
         <p:nvSpPr>
-          <p:cNvPr id="3" name="Text Placeholder 2"/>
+          <p:cNvPr id="3" name="Content Placeholder 2"/>
           <p:cNvSpPr>
             <a:spLocks noGrp="1"/>
           </p:cNvSpPr>
           <p:nvPr>
-            <p:ph type="body" idx="1"/>
+            <p:ph idx="1"/>
           </p:nvPr>
         </p:nvSpPr>
         <p:spPr/>
@@ -10264,14 +10308,120 @@
           <a:bodyPr/>
           <a:lstStyle/>
           <a:p>
-            <a:endParaRPr lang="en-US"/>
+            <a:r>
+              <a:rPr lang="en-US" dirty="0" err="1" smtClean="0"/>
+              <a:t>Cada</a:t>
+            </a:r>
+            <a:r>
+              <a:rPr lang="en-US" dirty="0" smtClean="0"/>
+              <a:t> </a:t>
+            </a:r>
+            <a:r>
+              <a:rPr lang="en-US" dirty="0" err="1" smtClean="0"/>
+              <a:t>estudante</a:t>
+            </a:r>
+            <a:r>
+              <a:rPr lang="en-US" dirty="0" smtClean="0"/>
+              <a:t> </a:t>
+            </a:r>
+            <a:r>
+              <a:rPr lang="en-US" dirty="0" err="1" smtClean="0"/>
+              <a:t>deve</a:t>
+            </a:r>
+            <a:r>
+              <a:rPr lang="en-US" dirty="0" smtClean="0"/>
+              <a:t> se </a:t>
+            </a:r>
+            <a:r>
+              <a:rPr lang="en-US" dirty="0" err="1" smtClean="0"/>
+              <a:t>inscrever</a:t>
+            </a:r>
+            <a:r>
+              <a:rPr lang="en-US" dirty="0" smtClean="0"/>
+              <a:t> </a:t>
+            </a:r>
+            <a:r>
+              <a:rPr lang="en-US" dirty="0" err="1" smtClean="0"/>
+              <a:t>em</a:t>
+            </a:r>
+            <a:r>
+              <a:rPr lang="en-US" dirty="0" smtClean="0"/>
+              <a:t> um </a:t>
+            </a:r>
+            <a:r>
+              <a:rPr lang="en-US" dirty="0" err="1" smtClean="0"/>
+              <a:t>projeto</a:t>
+            </a:r>
+            <a:r>
+              <a:rPr lang="en-US" dirty="0" smtClean="0"/>
+              <a:t>;</a:t>
+            </a:r>
+          </a:p>
+          <a:p>
+            <a:r>
+              <a:rPr lang="en-US" dirty="0" err="1" smtClean="0"/>
+              <a:t>Os</a:t>
+            </a:r>
+            <a:r>
+              <a:rPr lang="en-US" dirty="0" smtClean="0"/>
+              <a:t> </a:t>
+            </a:r>
+            <a:r>
+              <a:rPr lang="en-US" dirty="0" err="1" smtClean="0"/>
+              <a:t>projetos</a:t>
+            </a:r>
+            <a:r>
+              <a:rPr lang="en-US" dirty="0" smtClean="0"/>
+              <a:t> </a:t>
+            </a:r>
+            <a:r>
+              <a:rPr lang="en-US" dirty="0" err="1" smtClean="0"/>
+              <a:t>servem</a:t>
+            </a:r>
+            <a:r>
+              <a:rPr lang="en-US" dirty="0" smtClean="0"/>
+              <a:t> </a:t>
+            </a:r>
+            <a:r>
+              <a:rPr lang="en-US" dirty="0" err="1" smtClean="0"/>
+              <a:t>como</a:t>
+            </a:r>
+            <a:r>
+              <a:rPr lang="en-US" dirty="0" smtClean="0"/>
+              <a:t> </a:t>
+            </a:r>
+            <a:r>
+              <a:rPr lang="en-US" dirty="0" err="1" smtClean="0"/>
+              <a:t>catalisador</a:t>
+            </a:r>
+            <a:r>
+              <a:rPr lang="en-US" dirty="0" smtClean="0"/>
+              <a:t> do </a:t>
+            </a:r>
+            <a:r>
+              <a:rPr lang="en-US" dirty="0" err="1" smtClean="0"/>
+              <a:t>relacionamento</a:t>
+            </a:r>
+            <a:r>
+              <a:rPr lang="en-US" dirty="0" smtClean="0"/>
+              <a:t> professor x </a:t>
+            </a:r>
+            <a:r>
+              <a:rPr lang="en-US" dirty="0" err="1" smtClean="0"/>
+              <a:t>aluno</a:t>
+            </a:r>
+            <a:r>
+              <a:rPr lang="en-US" dirty="0" smtClean="0"/>
+              <a:t>;</a:t>
+            </a:r>
+            <a:endParaRPr lang="en-US" dirty="0"/>
           </a:p>
         </p:txBody>
       </p:sp>
     </p:spTree>
     <p:extLst>
       <p:ext uri="{BB962C8B-B14F-4D97-AF65-F5344CB8AC3E}">
-        <p14:creationId xmlns:p14="http://schemas.microsoft.com/office/powerpoint/2010/main" val="3219114231"/>
+        <p14:creationId xmlns:p14="http://schemas.microsoft.com/office/powerpoint/2010/main" val="2101056662"/>
       </p:ext>
     </p:extLst>
   </p:cSld>

</xml_diff>

<commit_message>
Refs #3, #18. Tasks and first article.
</commit_message>
<xml_diff>
--- a/doc/articles/part1/presentation.pptx
+++ b/doc/articles/part1/presentation.pptx
@@ -16,8 +16,9 @@
     <p:sldId id="266" r:id="rId10"/>
     <p:sldId id="265" r:id="rId11"/>
     <p:sldId id="258" r:id="rId12"/>
-    <p:sldId id="260" r:id="rId13"/>
+    <p:sldId id="269" r:id="rId13"/>
     <p:sldId id="259" r:id="rId14"/>
+    <p:sldId id="260" r:id="rId15"/>
   </p:sldIdLst>
   <p:sldSz cx="9144000" cy="6858000" type="screen4x3"/>
   <p:notesSz cx="6858000" cy="9144000"/>
@@ -614,7 +615,7 @@
           <a:p>
             <a:fld id="{D81FDC16-1F7F-5847-BEAB-E5F1BD18EA5F}" type="datetimeFigureOut">
               <a:rPr lang="en-US" smtClean="0"/>
-              <a:t>2/28/13</a:t>
+              <a:t>3/5/13</a:t>
             </a:fld>
             <a:endParaRPr lang="en-US"/>
           </a:p>
@@ -840,7 +841,7 @@
           <a:p>
             <a:fld id="{D81FDC16-1F7F-5847-BEAB-E5F1BD18EA5F}" type="datetimeFigureOut">
               <a:rPr lang="en-US" smtClean="0"/>
-              <a:t>2/28/13</a:t>
+              <a:t>3/5/13</a:t>
             </a:fld>
             <a:endParaRPr lang="en-US"/>
           </a:p>
@@ -1015,7 +1016,7 @@
           <a:p>
             <a:fld id="{D81FDC16-1F7F-5847-BEAB-E5F1BD18EA5F}" type="datetimeFigureOut">
               <a:rPr lang="en-US" smtClean="0"/>
-              <a:t>2/28/13</a:t>
+              <a:t>3/5/13</a:t>
             </a:fld>
             <a:endParaRPr lang="en-US"/>
           </a:p>
@@ -1180,7 +1181,7 @@
           <a:p>
             <a:fld id="{D81FDC16-1F7F-5847-BEAB-E5F1BD18EA5F}" type="datetimeFigureOut">
               <a:rPr lang="en-US" smtClean="0"/>
-              <a:t>2/28/13</a:t>
+              <a:t>3/5/13</a:t>
             </a:fld>
             <a:endParaRPr lang="en-US"/>
           </a:p>
@@ -1421,7 +1422,7 @@
           <a:p>
             <a:fld id="{D81FDC16-1F7F-5847-BEAB-E5F1BD18EA5F}" type="datetimeFigureOut">
               <a:rPr lang="en-US" smtClean="0"/>
-              <a:t>2/28/13</a:t>
+              <a:t>3/5/13</a:t>
             </a:fld>
             <a:endParaRPr lang="en-US"/>
           </a:p>
@@ -1534,7 +1535,7 @@
           <a:p>
             <a:fld id="{D81FDC16-1F7F-5847-BEAB-E5F1BD18EA5F}" type="datetimeFigureOut">
               <a:rPr lang="en-US" smtClean="0"/>
-              <a:t>2/28/13</a:t>
+              <a:t>3/5/13</a:t>
             </a:fld>
             <a:endParaRPr lang="en-US"/>
           </a:p>
@@ -1911,7 +1912,7 @@
           <a:p>
             <a:fld id="{D81FDC16-1F7F-5847-BEAB-E5F1BD18EA5F}" type="datetimeFigureOut">
               <a:rPr lang="en-US" smtClean="0"/>
-              <a:t>2/28/13</a:t>
+              <a:t>3/5/13</a:t>
             </a:fld>
             <a:endParaRPr lang="en-US"/>
           </a:p>
@@ -7556,7 +7557,7 @@
           <a:p>
             <a:fld id="{D81FDC16-1F7F-5847-BEAB-E5F1BD18EA5F}" type="datetimeFigureOut">
               <a:rPr lang="en-US" smtClean="0"/>
-              <a:t>2/28/13</a:t>
+              <a:t>3/5/13</a:t>
             </a:fld>
             <a:endParaRPr lang="en-US"/>
           </a:p>
@@ -7646,7 +7647,7 @@
           <a:p>
             <a:fld id="{D81FDC16-1F7F-5847-BEAB-E5F1BD18EA5F}" type="datetimeFigureOut">
               <a:rPr lang="en-US" smtClean="0"/>
-              <a:t>2/28/13</a:t>
+              <a:t>3/5/13</a:t>
             </a:fld>
             <a:endParaRPr lang="en-US"/>
           </a:p>
@@ -7918,7 +7919,7 @@
           <a:p>
             <a:fld id="{D81FDC16-1F7F-5847-BEAB-E5F1BD18EA5F}" type="datetimeFigureOut">
               <a:rPr lang="en-US" smtClean="0"/>
-              <a:t>2/28/13</a:t>
+              <a:t>3/5/13</a:t>
             </a:fld>
             <a:endParaRPr lang="en-US"/>
           </a:p>
@@ -8226,7 +8227,7 @@
           <a:p>
             <a:fld id="{D81FDC16-1F7F-5847-BEAB-E5F1BD18EA5F}" type="datetimeFigureOut">
               <a:rPr lang="en-US" smtClean="0"/>
-              <a:t>2/28/13</a:t>
+              <a:t>3/5/13</a:t>
             </a:fld>
             <a:endParaRPr lang="en-US"/>
           </a:p>
@@ -8463,7 +8464,7 @@
           <a:p>
             <a:fld id="{D81FDC16-1F7F-5847-BEAB-E5F1BD18EA5F}" type="datetimeFigureOut">
               <a:rPr lang="en-US" smtClean="0"/>
-              <a:t>2/28/13</a:t>
+              <a:t>3/5/13</a:t>
             </a:fld>
             <a:endParaRPr lang="en-US"/>
           </a:p>
@@ -9126,11 +9127,7 @@
             </a:r>
             <a:r>
               <a:rPr lang="en-US" dirty="0" err="1" smtClean="0"/>
-              <a:t>Inscri</a:t>
-            </a:r>
-            <a:r>
-              <a:rPr lang="en-US" dirty="0" err="1" smtClean="0"/>
-              <a:t>ção</a:t>
+              <a:t>Inscrição</a:t>
             </a:r>
             <a:r>
               <a:rPr lang="en-US" dirty="0"/>
@@ -9281,7 +9278,7 @@
       </p:grpSpPr>
       <p:pic>
         <p:nvPicPr>
-          <p:cNvPr id="6" name="Content Placeholder 5" descr="eer-diagram.png"/>
+          <p:cNvPr id="6" name="Content Placeholder 5" descr="eer-diagram1.png"/>
           <p:cNvPicPr>
             <a:picLocks noGrp="1" noChangeAspect="1"/>
           </p:cNvPicPr>
@@ -9297,20 +9294,20 @@
               </a:ext>
             </a:extLst>
           </a:blip>
-          <a:srcRect l="-529" r="-36"/>
+          <a:srcRect l="-487" r="-657"/>
           <a:stretch/>
         </p:blipFill>
         <p:spPr>
           <a:xfrm>
-            <a:off x="405892" y="116959"/>
-            <a:ext cx="8418962" cy="6435812"/>
+            <a:off x="248488" y="124253"/>
+            <a:ext cx="8680026" cy="6433472"/>
           </a:xfrm>
         </p:spPr>
       </p:pic>
     </p:spTree>
     <p:extLst>
       <p:ext uri="{BB962C8B-B14F-4D97-AF65-F5344CB8AC3E}">
-        <p14:creationId xmlns:p14="http://schemas.microsoft.com/office/powerpoint/2010/main" val="3112706936"/>
+        <p14:creationId xmlns:p14="http://schemas.microsoft.com/office/powerpoint/2010/main" val="2622176536"/>
       </p:ext>
     </p:extLst>
   </p:cSld>
@@ -9383,6 +9380,64 @@
     <p:extLst>
       <p:ext uri="{BB962C8B-B14F-4D97-AF65-F5344CB8AC3E}">
         <p14:creationId xmlns:p14="http://schemas.microsoft.com/office/powerpoint/2010/main" val="4229905702"/>
+      </p:ext>
+    </p:extLst>
+  </p:cSld>
+  <p:clrMapOvr>
+    <a:masterClrMapping/>
+  </p:clrMapOvr>
+</p:sld>
+</file>
+
+<file path=ppt/slides/slide14.xml><?xml version="1.0" encoding="utf-8"?>
+<p:sld xmlns:a="http://schemas.openxmlformats.org/drawingml/2006/main" xmlns:r="http://schemas.openxmlformats.org/officeDocument/2006/relationships" xmlns:p="http://schemas.openxmlformats.org/presentationml/2006/main">
+  <p:cSld>
+    <p:spTree>
+      <p:nvGrpSpPr>
+        <p:cNvPr id="1" name=""/>
+        <p:cNvGrpSpPr/>
+        <p:nvPr/>
+      </p:nvGrpSpPr>
+      <p:grpSpPr>
+        <a:xfrm>
+          <a:off x="0" y="0"/>
+          <a:ext cx="0" cy="0"/>
+          <a:chOff x="0" y="0"/>
+          <a:chExt cx="0" cy="0"/>
+        </a:xfrm>
+      </p:grpSpPr>
+      <p:pic>
+        <p:nvPicPr>
+          <p:cNvPr id="6" name="Content Placeholder 5" descr="eer-diagram.png"/>
+          <p:cNvPicPr>
+            <a:picLocks noGrp="1" noChangeAspect="1"/>
+          </p:cNvPicPr>
+          <p:nvPr>
+            <p:ph idx="1"/>
+          </p:nvPr>
+        </p:nvPicPr>
+        <p:blipFill rotWithShape="1">
+          <a:blip r:embed="rId2">
+            <a:extLst>
+              <a:ext uri="{28A0092B-C50C-407E-A947-70E740481C1C}">
+                <a14:useLocalDpi xmlns:a14="http://schemas.microsoft.com/office/drawing/2010/main" val="0"/>
+              </a:ext>
+            </a:extLst>
+          </a:blip>
+          <a:srcRect l="-529" r="-36"/>
+          <a:stretch/>
+        </p:blipFill>
+        <p:spPr>
+          <a:xfrm>
+            <a:off x="405892" y="116959"/>
+            <a:ext cx="8418962" cy="6435812"/>
+          </a:xfrm>
+        </p:spPr>
+      </p:pic>
+    </p:spTree>
+    <p:extLst>
+      <p:ext uri="{BB962C8B-B14F-4D97-AF65-F5344CB8AC3E}">
+        <p14:creationId xmlns:p14="http://schemas.microsoft.com/office/powerpoint/2010/main" val="3112706936"/>
       </p:ext>
     </p:extLst>
   </p:cSld>
@@ -9587,11 +9642,7 @@
             </a:r>
             <a:r>
               <a:rPr lang="en-US" dirty="0" err="1" smtClean="0"/>
-              <a:t>colabora</a:t>
-            </a:r>
-            <a:r>
-              <a:rPr lang="en-US" dirty="0" err="1" smtClean="0"/>
-              <a:t>ção</a:t>
+              <a:t>colaboração</a:t>
             </a:r>
             <a:r>
               <a:rPr lang="en-US" dirty="0" smtClean="0"/>
@@ -9809,29 +9860,62 @@
           <a:bodyPr/>
           <a:lstStyle/>
           <a:p>
-            <a:endParaRPr lang="en-US"/>
+            <a:r>
+              <a:rPr lang="en-US" dirty="0" err="1" smtClean="0"/>
+              <a:t>Tecnologias</a:t>
+            </a:r>
+            <a:endParaRPr lang="en-US" dirty="0"/>
           </a:p>
         </p:txBody>
       </p:sp>
-      <p:sp>
-        <p:nvSpPr>
-          <p:cNvPr id="3" name="Content Placeholder 2"/>
-          <p:cNvSpPr>
-            <a:spLocks noGrp="1"/>
-          </p:cNvSpPr>
-          <p:nvPr>
-            <p:ph idx="1"/>
-          </p:nvPr>
-        </p:nvSpPr>
-        <p:spPr/>
-        <p:txBody>
-          <a:bodyPr/>
-          <a:lstStyle/>
-          <a:p>
-            <a:endParaRPr lang="en-US"/>
-          </a:p>
-        </p:txBody>
-      </p:sp>
+      <p:pic>
+        <p:nvPicPr>
+          <p:cNvPr id="4" name="Picture 3"/>
+          <p:cNvPicPr>
+            <a:picLocks noChangeAspect="1"/>
+          </p:cNvPicPr>
+          <p:nvPr/>
+        </p:nvPicPr>
+        <p:blipFill>
+          <a:blip r:embed="rId2"/>
+          <a:stretch>
+            <a:fillRect/>
+          </a:stretch>
+        </p:blipFill>
+        <p:spPr>
+          <a:xfrm>
+            <a:off x="4710169" y="2900861"/>
+            <a:ext cx="3081306" cy="2440394"/>
+          </a:xfrm>
+          <a:prstGeom prst="rect">
+            <a:avLst/>
+          </a:prstGeom>
+        </p:spPr>
+      </p:pic>
+      <p:pic>
+        <p:nvPicPr>
+          <p:cNvPr id="5" name="Picture 4"/>
+          <p:cNvPicPr>
+            <a:picLocks noChangeAspect="1"/>
+          </p:cNvPicPr>
+          <p:nvPr/>
+        </p:nvPicPr>
+        <p:blipFill>
+          <a:blip r:embed="rId3"/>
+          <a:stretch>
+            <a:fillRect/>
+          </a:stretch>
+        </p:blipFill>
+        <p:spPr>
+          <a:xfrm>
+            <a:off x="875705" y="1948267"/>
+            <a:ext cx="3033811" cy="4045081"/>
+          </a:xfrm>
+          <a:prstGeom prst="rect">
+            <a:avLst/>
+          </a:prstGeom>
+        </p:spPr>
+      </p:pic>
     </p:spTree>
     <p:extLst>
       <p:ext uri="{BB962C8B-B14F-4D97-AF65-F5344CB8AC3E}">
@@ -9951,11 +10035,7 @@
           <a:p>
             <a:r>
               <a:rPr lang="en-US" dirty="0" err="1" smtClean="0"/>
-              <a:t>Inscri</a:t>
-            </a:r>
-            <a:r>
-              <a:rPr lang="en-US" dirty="0" err="1" smtClean="0"/>
-              <a:t>ção</a:t>
+              <a:t>Inscrição</a:t>
             </a:r>
             <a:r>
               <a:rPr lang="en-US" dirty="0" smtClean="0"/>
@@ -9982,11 +10062,7 @@
           <a:p>
             <a:r>
               <a:rPr lang="en-US" dirty="0" err="1" smtClean="0"/>
-              <a:t>Usu</a:t>
-            </a:r>
-            <a:r>
-              <a:rPr lang="en-US" dirty="0" err="1" smtClean="0"/>
-              <a:t>ários</a:t>
+              <a:t>Usuários</a:t>
             </a:r>
             <a:r>
               <a:rPr lang="en-US" dirty="0" smtClean="0"/>
@@ -10133,7 +10209,6 @@
               <a:rPr lang="en-US" dirty="0"/>
               <a:t>;</a:t>
             </a:r>
-            <a:endParaRPr lang="en-US" dirty="0"/>
           </a:p>
         </p:txBody>
       </p:sp>
@@ -10267,11 +10342,7 @@
           <a:p>
             <a:r>
               <a:rPr lang="en-US" dirty="0" err="1" smtClean="0"/>
-              <a:t>Inscri</a:t>
-            </a:r>
-            <a:r>
-              <a:rPr lang="en-US" dirty="0" err="1" smtClean="0"/>
-              <a:t>ção</a:t>
+              <a:t>Inscrição</a:t>
             </a:r>
             <a:r>
               <a:rPr lang="en-US" dirty="0" smtClean="0"/>

</xml_diff>